<commit_message>
weekly updates & minor mistake in flow chart
</commit_message>
<xml_diff>
--- a/Weekly Updates/Week 10.pptx
+++ b/Weekly Updates/Week 10.pptx
@@ -192,7 +192,7 @@
   <pc:docChgLst>
     <pc:chgData name="Qinlin Gu" userId="fe9bce0e-efb5-4753-b86a-c33ce0aa4cc0" providerId="ADAL" clId="{475E2740-78E2-49F3-BC0C-F026CFE3DCD3}"/>
     <pc:docChg chg="custSel delSld modSld modSection">
-      <pc:chgData name="Qinlin Gu" userId="fe9bce0e-efb5-4753-b86a-c33ce0aa4cc0" providerId="ADAL" clId="{475E2740-78E2-49F3-BC0C-F026CFE3DCD3}" dt="2022-05-08T04:13:18.510" v="447" actId="20577"/>
+      <pc:chgData name="Qinlin Gu" userId="fe9bce0e-efb5-4753-b86a-c33ce0aa4cc0" providerId="ADAL" clId="{475E2740-78E2-49F3-BC0C-F026CFE3DCD3}" dt="2022-05-08T05:57:07.623" v="456" actId="14826"/>
       <pc:docMkLst>
         <pc:docMk/>
       </pc:docMkLst>
@@ -272,6 +272,29 @@
             <ac:spMk id="4" creationId="{F79E8E1A-6AC7-3F4E-8F0D-D3A7F823361E}"/>
           </ac:spMkLst>
         </pc:spChg>
+      </pc:sldChg>
+      <pc:sldChg chg="addSp delSp modSp mod">
+        <pc:chgData name="Qinlin Gu" userId="fe9bce0e-efb5-4753-b86a-c33ce0aa4cc0" providerId="ADAL" clId="{475E2740-78E2-49F3-BC0C-F026CFE3DCD3}" dt="2022-05-08T05:57:07.623" v="456" actId="14826"/>
+        <pc:sldMkLst>
+          <pc:docMk/>
+          <pc:sldMk cId="748395405" sldId="343"/>
+        </pc:sldMkLst>
+        <pc:spChg chg="del">
+          <ac:chgData name="Qinlin Gu" userId="fe9bce0e-efb5-4753-b86a-c33ce0aa4cc0" providerId="ADAL" clId="{475E2740-78E2-49F3-BC0C-F026CFE3DCD3}" dt="2022-05-08T05:53:36.928" v="448" actId="931"/>
+          <ac:spMkLst>
+            <pc:docMk/>
+            <pc:sldMk cId="748395405" sldId="343"/>
+            <ac:spMk id="2" creationId="{008D39C9-FC9D-224A-AFB2-78E9D6444972}"/>
+          </ac:spMkLst>
+        </pc:spChg>
+        <pc:picChg chg="add mod">
+          <ac:chgData name="Qinlin Gu" userId="fe9bce0e-efb5-4753-b86a-c33ce0aa4cc0" providerId="ADAL" clId="{475E2740-78E2-49F3-BC0C-F026CFE3DCD3}" dt="2022-05-08T05:57:07.623" v="456" actId="14826"/>
+          <ac:picMkLst>
+            <pc:docMk/>
+            <pc:sldMk cId="748395405" sldId="343"/>
+            <ac:picMk id="5" creationId="{8D224F74-311B-30CF-04BC-8A9ECE2190C0}"/>
+          </ac:picMkLst>
+        </pc:picChg>
       </pc:sldChg>
       <pc:sldChg chg="del">
         <pc:chgData name="Qinlin Gu" userId="fe9bce0e-efb5-4753-b86a-c33ce0aa4cc0" providerId="ADAL" clId="{475E2740-78E2-49F3-BC0C-F026CFE3DCD3}" dt="2022-05-08T04:09:29.849" v="289" actId="2696"/>
@@ -4930,14 +4953,14 @@
           </a:ln>
           <a:extLst>
             <a:ext uri="{909E8E84-426E-40dd-AFC4-6F175D3DCCD1}">
-              <a14:hiddenFill xmlns:a14="http://schemas.microsoft.com/office/drawing/2010/main" xmlns="">
+              <a14:hiddenFill xmlns="" xmlns:a14="http://schemas.microsoft.com/office/drawing/2010/main">
                 <a:solidFill>
                   <a:srgbClr val="FFFFFF"/>
                 </a:solidFill>
               </a14:hiddenFill>
             </a:ext>
             <a:ext uri="{91240B29-F687-4f45-9708-019B960494DF}">
-              <a14:hiddenLine xmlns:a14="http://schemas.microsoft.com/office/drawing/2010/main" xmlns="" w="9525">
+              <a14:hiddenLine xmlns="" xmlns:a14="http://schemas.microsoft.com/office/drawing/2010/main" w="9525">
                 <a:solidFill>
                   <a:srgbClr val="000000"/>
                 </a:solidFill>
@@ -4947,7 +4970,7 @@
               </a14:hiddenLine>
             </a:ext>
             <a:ext uri="{FAA26D3D-D897-4be2-8F04-BA451C77F1D7}">
-              <ma14:placeholderFlag xmlns:ma14="http://schemas.microsoft.com/office/mac/drawingml/2011/main" xmlns="" val="1"/>
+              <ma14:placeholderFlag xmlns="" xmlns:ma14="http://schemas.microsoft.com/office/mac/drawingml/2011/main" val="1"/>
             </a:ext>
           </a:extLst>
         </p:spPr>
@@ -5027,14 +5050,14 @@
           </a:ln>
           <a:extLst>
             <a:ext uri="{909E8E84-426E-40dd-AFC4-6F175D3DCCD1}">
-              <a14:hiddenFill xmlns:a14="http://schemas.microsoft.com/office/drawing/2010/main" xmlns="">
+              <a14:hiddenFill xmlns="" xmlns:a14="http://schemas.microsoft.com/office/drawing/2010/main">
                 <a:solidFill>
                   <a:srgbClr val="FFFFFF"/>
                 </a:solidFill>
               </a14:hiddenFill>
             </a:ext>
             <a:ext uri="{91240B29-F687-4f45-9708-019B960494DF}">
-              <a14:hiddenLine xmlns:a14="http://schemas.microsoft.com/office/drawing/2010/main" xmlns="" w="9525">
+              <a14:hiddenLine xmlns="" xmlns:a14="http://schemas.microsoft.com/office/drawing/2010/main" w="9525">
                 <a:solidFill>
                   <a:srgbClr val="000000"/>
                 </a:solidFill>
@@ -5044,7 +5067,7 @@
               </a14:hiddenLine>
             </a:ext>
             <a:ext uri="{FAA26D3D-D897-4be2-8F04-BA451C77F1D7}">
-              <ma14:placeholderFlag xmlns:ma14="http://schemas.microsoft.com/office/mac/drawingml/2011/main" xmlns="" val="1"/>
+              <ma14:placeholderFlag xmlns="" xmlns:ma14="http://schemas.microsoft.com/office/mac/drawingml/2011/main" val="1"/>
             </a:ext>
           </a:extLst>
         </p:spPr>
@@ -5361,14 +5384,14 @@
           </a:ln>
           <a:extLst>
             <a:ext uri="{909E8E84-426E-40dd-AFC4-6F175D3DCCD1}">
-              <a14:hiddenFill xmlns:a14="http://schemas.microsoft.com/office/drawing/2010/main" xmlns="">
+              <a14:hiddenFill xmlns="" xmlns:a14="http://schemas.microsoft.com/office/drawing/2010/main">
                 <a:solidFill>
                   <a:srgbClr val="FFFFFF"/>
                 </a:solidFill>
               </a14:hiddenFill>
             </a:ext>
             <a:ext uri="{91240B29-F687-4f45-9708-019B960494DF}">
-              <a14:hiddenLine xmlns:a14="http://schemas.microsoft.com/office/drawing/2010/main" xmlns="" w="9525">
+              <a14:hiddenLine xmlns="" xmlns:a14="http://schemas.microsoft.com/office/drawing/2010/main" w="9525">
                 <a:solidFill>
                   <a:srgbClr val="000000"/>
                 </a:solidFill>
@@ -5378,7 +5401,7 @@
               </a14:hiddenLine>
             </a:ext>
             <a:ext uri="{FAA26D3D-D897-4be2-8F04-BA451C77F1D7}">
-              <ma14:placeholderFlag xmlns:ma14="http://schemas.microsoft.com/office/mac/drawingml/2011/main" xmlns="" val="1"/>
+              <ma14:placeholderFlag xmlns="" xmlns:ma14="http://schemas.microsoft.com/office/mac/drawingml/2011/main" val="1"/>
             </a:ext>
           </a:extLst>
         </p:spPr>
@@ -5575,14 +5598,14 @@
           </a:ln>
           <a:extLst>
             <a:ext uri="{909E8E84-426E-40dd-AFC4-6F175D3DCCD1}">
-              <a14:hiddenFill xmlns:a14="http://schemas.microsoft.com/office/drawing/2010/main" xmlns="">
+              <a14:hiddenFill xmlns="" xmlns:a14="http://schemas.microsoft.com/office/drawing/2010/main">
                 <a:solidFill>
                   <a:srgbClr val="FFFFFF"/>
                 </a:solidFill>
               </a14:hiddenFill>
             </a:ext>
             <a:ext uri="{91240B29-F687-4f45-9708-019B960494DF}">
-              <a14:hiddenLine xmlns:a14="http://schemas.microsoft.com/office/drawing/2010/main" xmlns="" w="9525">
+              <a14:hiddenLine xmlns="" xmlns:a14="http://schemas.microsoft.com/office/drawing/2010/main" w="9525">
                 <a:solidFill>
                   <a:srgbClr val="000000"/>
                 </a:solidFill>
@@ -5592,7 +5615,7 @@
               </a14:hiddenLine>
             </a:ext>
             <a:ext uri="{FAA26D3D-D897-4be2-8F04-BA451C77F1D7}">
-              <ma14:placeholderFlag xmlns:ma14="http://schemas.microsoft.com/office/mac/drawingml/2011/main" xmlns="" val="1"/>
+              <ma14:placeholderFlag xmlns="" xmlns:ma14="http://schemas.microsoft.com/office/mac/drawingml/2011/main" val="1"/>
             </a:ext>
           </a:extLst>
         </p:spPr>
@@ -5842,14 +5865,14 @@
           </a:ln>
           <a:extLst>
             <a:ext uri="{909E8E84-426E-40dd-AFC4-6F175D3DCCD1}">
-              <a14:hiddenFill xmlns:a14="http://schemas.microsoft.com/office/drawing/2010/main" xmlns="">
+              <a14:hiddenFill xmlns="" xmlns:a14="http://schemas.microsoft.com/office/drawing/2010/main">
                 <a:solidFill>
                   <a:srgbClr val="FFFFFF"/>
                 </a:solidFill>
               </a14:hiddenFill>
             </a:ext>
             <a:ext uri="{91240B29-F687-4f45-9708-019B960494DF}">
-              <a14:hiddenLine xmlns:a14="http://schemas.microsoft.com/office/drawing/2010/main" xmlns="" w="9525">
+              <a14:hiddenLine xmlns="" xmlns:a14="http://schemas.microsoft.com/office/drawing/2010/main" w="9525">
                 <a:solidFill>
                   <a:srgbClr val="000000"/>
                 </a:solidFill>
@@ -5859,7 +5882,7 @@
               </a14:hiddenLine>
             </a:ext>
             <a:ext uri="{FAA26D3D-D897-4be2-8F04-BA451C77F1D7}">
-              <ma14:placeholderFlag xmlns:ma14="http://schemas.microsoft.com/office/mac/drawingml/2011/main" xmlns="" val="1"/>
+              <ma14:placeholderFlag xmlns="" xmlns:ma14="http://schemas.microsoft.com/office/mac/drawingml/2011/main" val="1"/>
             </a:ext>
           </a:extLst>
         </p:spPr>
@@ -6094,14 +6117,14 @@
           </a:ln>
           <a:extLst>
             <a:ext uri="{909E8E84-426E-40dd-AFC4-6F175D3DCCD1}">
-              <a14:hiddenFill xmlns:a14="http://schemas.microsoft.com/office/drawing/2010/main" xmlns="">
+              <a14:hiddenFill xmlns="" xmlns:a14="http://schemas.microsoft.com/office/drawing/2010/main">
                 <a:solidFill>
                   <a:srgbClr val="FFFFFF"/>
                 </a:solidFill>
               </a14:hiddenFill>
             </a:ext>
             <a:ext uri="{91240B29-F687-4f45-9708-019B960494DF}">
-              <a14:hiddenLine xmlns:a14="http://schemas.microsoft.com/office/drawing/2010/main" xmlns="" w="9525">
+              <a14:hiddenLine xmlns="" xmlns:a14="http://schemas.microsoft.com/office/drawing/2010/main" w="9525">
                 <a:solidFill>
                   <a:srgbClr val="000000"/>
                 </a:solidFill>
@@ -6111,7 +6134,7 @@
               </a14:hiddenLine>
             </a:ext>
             <a:ext uri="{FAA26D3D-D897-4be2-8F04-BA451C77F1D7}">
-              <ma14:placeholderFlag xmlns:ma14="http://schemas.microsoft.com/office/mac/drawingml/2011/main" xmlns="" val="1"/>
+              <ma14:placeholderFlag xmlns="" xmlns:ma14="http://schemas.microsoft.com/office/mac/drawingml/2011/main" val="1"/>
             </a:ext>
           </a:extLst>
         </p:spPr>
@@ -6191,14 +6214,14 @@
           </a:ln>
           <a:extLst>
             <a:ext uri="{909E8E84-426E-40dd-AFC4-6F175D3DCCD1}">
-              <a14:hiddenFill xmlns:a14="http://schemas.microsoft.com/office/drawing/2010/main" xmlns="">
+              <a14:hiddenFill xmlns="" xmlns:a14="http://schemas.microsoft.com/office/drawing/2010/main">
                 <a:solidFill>
                   <a:srgbClr val="FFFFFF"/>
                 </a:solidFill>
               </a14:hiddenFill>
             </a:ext>
             <a:ext uri="{91240B29-F687-4f45-9708-019B960494DF}">
-              <a14:hiddenLine xmlns:a14="http://schemas.microsoft.com/office/drawing/2010/main" xmlns="" w="9525">
+              <a14:hiddenLine xmlns="" xmlns:a14="http://schemas.microsoft.com/office/drawing/2010/main" w="9525">
                 <a:solidFill>
                   <a:srgbClr val="000000"/>
                 </a:solidFill>
@@ -6208,7 +6231,7 @@
               </a14:hiddenLine>
             </a:ext>
             <a:ext uri="{FAA26D3D-D897-4be2-8F04-BA451C77F1D7}">
-              <ma14:placeholderFlag xmlns:ma14="http://schemas.microsoft.com/office/mac/drawingml/2011/main" xmlns="" val="1"/>
+              <ma14:placeholderFlag xmlns="" xmlns:ma14="http://schemas.microsoft.com/office/mac/drawingml/2011/main" val="1"/>
             </a:ext>
           </a:extLst>
         </p:spPr>
@@ -6293,14 +6316,14 @@
           </a:ln>
           <a:extLst>
             <a:ext uri="{909E8E84-426E-40dd-AFC4-6F175D3DCCD1}">
-              <a14:hiddenFill xmlns:a14="http://schemas.microsoft.com/office/drawing/2010/main" xmlns="">
+              <a14:hiddenFill xmlns="" xmlns:a14="http://schemas.microsoft.com/office/drawing/2010/main">
                 <a:solidFill>
                   <a:srgbClr val="FFFFFF"/>
                 </a:solidFill>
               </a14:hiddenFill>
             </a:ext>
             <a:ext uri="{91240B29-F687-4f45-9708-019B960494DF}">
-              <a14:hiddenLine xmlns:a14="http://schemas.microsoft.com/office/drawing/2010/main" xmlns="" w="9525">
+              <a14:hiddenLine xmlns="" xmlns:a14="http://schemas.microsoft.com/office/drawing/2010/main" w="9525">
                 <a:solidFill>
                   <a:srgbClr val="000000"/>
                 </a:solidFill>
@@ -6442,14 +6465,14 @@
           </a:ln>
           <a:extLst>
             <a:ext uri="{909E8E84-426E-40dd-AFC4-6F175D3DCCD1}">
-              <a14:hiddenFill xmlns:a14="http://schemas.microsoft.com/office/drawing/2010/main" xmlns="">
+              <a14:hiddenFill xmlns="" xmlns:a14="http://schemas.microsoft.com/office/drawing/2010/main">
                 <a:solidFill>
                   <a:srgbClr val="FFFFFF"/>
                 </a:solidFill>
               </a14:hiddenFill>
             </a:ext>
             <a:ext uri="{91240B29-F687-4f45-9708-019B960494DF}">
-              <a14:hiddenLine xmlns:a14="http://schemas.microsoft.com/office/drawing/2010/main" xmlns="" w="9525">
+              <a14:hiddenLine xmlns="" xmlns:a14="http://schemas.microsoft.com/office/drawing/2010/main" w="9525">
                 <a:solidFill>
                   <a:srgbClr val="000000"/>
                 </a:solidFill>
@@ -6459,7 +6482,7 @@
               </a14:hiddenLine>
             </a:ext>
             <a:ext uri="{FAA26D3D-D897-4be2-8F04-BA451C77F1D7}">
-              <ma14:placeholderFlag xmlns:ma14="http://schemas.microsoft.com/office/mac/drawingml/2011/main" xmlns="" val="1"/>
+              <ma14:placeholderFlag xmlns="" xmlns:ma14="http://schemas.microsoft.com/office/mac/drawingml/2011/main" val="1"/>
             </a:ext>
           </a:extLst>
         </p:spPr>
@@ -9504,14 +9527,14 @@
           </a:ln>
           <a:extLst>
             <a:ext uri="{909E8E84-426E-40dd-AFC4-6F175D3DCCD1}">
-              <a14:hiddenFill xmlns:a14="http://schemas.microsoft.com/office/drawing/2010/main" xmlns="">
+              <a14:hiddenFill xmlns="" xmlns:a14="http://schemas.microsoft.com/office/drawing/2010/main">
                 <a:solidFill>
                   <a:srgbClr val="FFFFFF"/>
                 </a:solidFill>
               </a14:hiddenFill>
             </a:ext>
             <a:ext uri="{91240B29-F687-4f45-9708-019B960494DF}">
-              <a14:hiddenLine xmlns:a14="http://schemas.microsoft.com/office/drawing/2010/main" xmlns="" w="9525">
+              <a14:hiddenLine xmlns="" xmlns:a14="http://schemas.microsoft.com/office/drawing/2010/main" w="9525">
                 <a:solidFill>
                   <a:srgbClr val="000000"/>
                 </a:solidFill>
@@ -9521,7 +9544,7 @@
               </a14:hiddenLine>
             </a:ext>
             <a:ext uri="{FAA26D3D-D897-4be2-8F04-BA451C77F1D7}">
-              <ma14:placeholderFlag xmlns:ma14="http://schemas.microsoft.com/office/mac/drawingml/2011/main" xmlns="" val="1"/>
+              <ma14:placeholderFlag xmlns="" xmlns:ma14="http://schemas.microsoft.com/office/mac/drawingml/2011/main" val="1"/>
             </a:ext>
           </a:extLst>
         </p:spPr>
@@ -9571,14 +9594,14 @@
           </a:ln>
           <a:extLst>
             <a:ext uri="{909E8E84-426E-40dd-AFC4-6F175D3DCCD1}">
-              <a14:hiddenFill xmlns:a14="http://schemas.microsoft.com/office/drawing/2010/main" xmlns="">
+              <a14:hiddenFill xmlns="" xmlns:a14="http://schemas.microsoft.com/office/drawing/2010/main">
                 <a:solidFill>
                   <a:srgbClr val="FFFFFF"/>
                 </a:solidFill>
               </a14:hiddenFill>
             </a:ext>
             <a:ext uri="{91240B29-F687-4f45-9708-019B960494DF}">
-              <a14:hiddenLine xmlns:a14="http://schemas.microsoft.com/office/drawing/2010/main" xmlns="" w="9525">
+              <a14:hiddenLine xmlns="" xmlns:a14="http://schemas.microsoft.com/office/drawing/2010/main" w="9525">
                 <a:solidFill>
                   <a:srgbClr val="000000"/>
                 </a:solidFill>
@@ -9588,7 +9611,7 @@
               </a14:hiddenLine>
             </a:ext>
             <a:ext uri="{FAA26D3D-D897-4be2-8F04-BA451C77F1D7}">
-              <ma14:placeholderFlag xmlns:ma14="http://schemas.microsoft.com/office/mac/drawingml/2011/main" xmlns="" val="1"/>
+              <ma14:placeholderFlag xmlns="" xmlns:ma14="http://schemas.microsoft.com/office/mac/drawingml/2011/main" val="1"/>
             </a:ext>
           </a:extLst>
         </p:spPr>
@@ -10327,31 +10350,34 @@
           <a:chExt cx="0" cy="0"/>
         </a:xfrm>
       </p:grpSpPr>
-      <p:sp>
-        <p:nvSpPr>
-          <p:cNvPr id="2" name="Content Placeholder 1">
-            <a:extLst>
-              <a:ext uri="{FF2B5EF4-FFF2-40B4-BE49-F238E27FC236}">
-                <a16:creationId xmlns:a16="http://schemas.microsoft.com/office/drawing/2014/main" id="{008D39C9-FC9D-224A-AFB2-78E9D6444972}"/>
-              </a:ext>
-            </a:extLst>
-          </p:cNvPr>
-          <p:cNvSpPr>
-            <a:spLocks noGrp="1"/>
-          </p:cNvSpPr>
+      <p:pic>
+        <p:nvPicPr>
+          <p:cNvPr id="5" name="内容占位符 4">
+            <a:extLst>
+              <a:ext uri="{FF2B5EF4-FFF2-40B4-BE49-F238E27FC236}">
+                <a16:creationId xmlns:a16="http://schemas.microsoft.com/office/drawing/2014/main" id="{8D224F74-311B-30CF-04BC-8A9ECE2190C0}"/>
+              </a:ext>
+            </a:extLst>
+          </p:cNvPr>
+          <p:cNvPicPr>
+            <a:picLocks noGrp="1" noChangeAspect="1"/>
+          </p:cNvPicPr>
           <p:nvPr>
             <p:ph idx="1"/>
           </p:nvPr>
-        </p:nvSpPr>
-        <p:spPr/>
-        <p:txBody>
-          <a:bodyPr/>
-          <a:lstStyle/>
-          <a:p>
-            <a:endParaRPr lang="en-US" b="0" dirty="0"/>
-          </a:p>
-        </p:txBody>
-      </p:sp>
+        </p:nvPicPr>
+        <p:blipFill>
+          <a:blip r:embed="rId2"/>
+          <a:srcRect/>
+          <a:stretch/>
+        </p:blipFill>
+        <p:spPr>
+          <a:xfrm>
+            <a:off x="1725120" y="861625"/>
+            <a:ext cx="5693759" cy="3986066"/>
+          </a:xfrm>
+        </p:spPr>
+      </p:pic>
       <p:sp>
         <p:nvSpPr>
           <p:cNvPr id="3" name="Title 2">

</xml_diff>